<commit_message>
lab 4 (take-home final) draft
</commit_message>
<xml_diff>
--- a/docs/slides/12-PrivacyLaw.pptx
+++ b/docs/slides/12-PrivacyLaw.pptx
@@ -148,6 +148,11 @@
       </a:defRPr>
     </a:lvl9pPr>
   </p:defaultTextStyle>
+  <p:extLst>
+    <p:ext uri="{EFAFB233-063F-42B5-8137-9DF3F51BA10A}">
+      <p15:sldGuideLst xmlns:p15="http://schemas.microsoft.com/office/powerpoint/2012/main"/>
+    </p:ext>
+  </p:extLst>
 </p:presentation>
 </file>
 
@@ -233,7 +238,7 @@
           <a:p>
             <a:fld id="{8F056EA2-8B1B-C340-B660-BC2CADC569EB}" type="datetimeFigureOut">
               <a:rPr lang="en-US" smtClean="0"/>
-              <a:t>2/23/22</a:t>
+              <a:t>2/8/23</a:t>
             </a:fld>
             <a:endParaRPr lang="en-US"/>
           </a:p>
@@ -1663,7 +1668,7 @@
           <a:p>
             <a:fld id="{19A37E14-C902-8243-905A-238D1EC85CD8}" type="datetimeFigureOut">
               <a:rPr lang="en-US" smtClean="0"/>
-              <a:t>2/23/22</a:t>
+              <a:t>2/8/23</a:t>
             </a:fld>
             <a:endParaRPr lang="en-US"/>
           </a:p>
@@ -1861,7 +1866,7 @@
           <a:p>
             <a:fld id="{19A37E14-C902-8243-905A-238D1EC85CD8}" type="datetimeFigureOut">
               <a:rPr lang="en-US" smtClean="0"/>
-              <a:t>2/23/22</a:t>
+              <a:t>2/8/23</a:t>
             </a:fld>
             <a:endParaRPr lang="en-US"/>
           </a:p>
@@ -2069,7 +2074,7 @@
           <a:p>
             <a:fld id="{19A37E14-C902-8243-905A-238D1EC85CD8}" type="datetimeFigureOut">
               <a:rPr lang="en-US" smtClean="0"/>
-              <a:t>2/23/22</a:t>
+              <a:t>2/8/23</a:t>
             </a:fld>
             <a:endParaRPr lang="en-US"/>
           </a:p>
@@ -2267,7 +2272,7 @@
           <a:p>
             <a:fld id="{19A37E14-C902-8243-905A-238D1EC85CD8}" type="datetimeFigureOut">
               <a:rPr lang="en-US" smtClean="0"/>
-              <a:t>2/23/22</a:t>
+              <a:t>2/8/23</a:t>
             </a:fld>
             <a:endParaRPr lang="en-US"/>
           </a:p>
@@ -2542,7 +2547,7 @@
           <a:p>
             <a:fld id="{19A37E14-C902-8243-905A-238D1EC85CD8}" type="datetimeFigureOut">
               <a:rPr lang="en-US" smtClean="0"/>
-              <a:t>2/23/22</a:t>
+              <a:t>2/8/23</a:t>
             </a:fld>
             <a:endParaRPr lang="en-US"/>
           </a:p>
@@ -2807,7 +2812,7 @@
           <a:p>
             <a:fld id="{19A37E14-C902-8243-905A-238D1EC85CD8}" type="datetimeFigureOut">
               <a:rPr lang="en-US" smtClean="0"/>
-              <a:t>2/23/22</a:t>
+              <a:t>2/8/23</a:t>
             </a:fld>
             <a:endParaRPr lang="en-US"/>
           </a:p>
@@ -3219,7 +3224,7 @@
           <a:p>
             <a:fld id="{19A37E14-C902-8243-905A-238D1EC85CD8}" type="datetimeFigureOut">
               <a:rPr lang="en-US" smtClean="0"/>
-              <a:t>2/23/22</a:t>
+              <a:t>2/8/23</a:t>
             </a:fld>
             <a:endParaRPr lang="en-US"/>
           </a:p>
@@ -3360,7 +3365,7 @@
           <a:p>
             <a:fld id="{19A37E14-C902-8243-905A-238D1EC85CD8}" type="datetimeFigureOut">
               <a:rPr lang="en-US" smtClean="0"/>
-              <a:t>2/23/22</a:t>
+              <a:t>2/8/23</a:t>
             </a:fld>
             <a:endParaRPr lang="en-US"/>
           </a:p>
@@ -3473,7 +3478,7 @@
           <a:p>
             <a:fld id="{19A37E14-C902-8243-905A-238D1EC85CD8}" type="datetimeFigureOut">
               <a:rPr lang="en-US" smtClean="0"/>
-              <a:t>2/23/22</a:t>
+              <a:t>2/8/23</a:t>
             </a:fld>
             <a:endParaRPr lang="en-US"/>
           </a:p>
@@ -3784,7 +3789,7 @@
           <a:p>
             <a:fld id="{19A37E14-C902-8243-905A-238D1EC85CD8}" type="datetimeFigureOut">
               <a:rPr lang="en-US" smtClean="0"/>
-              <a:t>2/23/22</a:t>
+              <a:t>2/8/23</a:t>
             </a:fld>
             <a:endParaRPr lang="en-US"/>
           </a:p>
@@ -4072,7 +4077,7 @@
           <a:p>
             <a:fld id="{19A37E14-C902-8243-905A-238D1EC85CD8}" type="datetimeFigureOut">
               <a:rPr lang="en-US" smtClean="0"/>
-              <a:t>2/23/22</a:t>
+              <a:t>2/8/23</a:t>
             </a:fld>
             <a:endParaRPr lang="en-US"/>
           </a:p>
@@ -4313,7 +4318,7 @@
           <a:p>
             <a:fld id="{19A37E14-C902-8243-905A-238D1EC85CD8}" type="datetimeFigureOut">
               <a:rPr lang="en-US" smtClean="0"/>
-              <a:t>2/23/22</a:t>
+              <a:t>2/8/23</a:t>
             </a:fld>
             <a:endParaRPr lang="en-US"/>
           </a:p>

</xml_diff>